<commit_message>
document verion 0.2, more details
</commit_message>
<xml_diff>
--- a/proj_digram.pptx
+++ b/proj_digram.pptx
@@ -104,6 +104,11 @@
       </a:defRPr>
     </a:lvl9pPr>
   </p:defaultTextStyle>
+  <p:extLst>
+    <p:ext uri="{EFAFB233-063F-42B5-8137-9DF3F51BA10A}">
+      <p15:sldGuideLst xmlns:p15="http://schemas.microsoft.com/office/powerpoint/2012/main"/>
+    </p:ext>
+  </p:extLst>
 </p:presentation>
 </file>
 
@@ -2972,7 +2977,7 @@
         </p:nvSpPr>
         <p:spPr>
           <a:xfrm>
-            <a:off x="5359400" y="421727"/>
+            <a:off x="6093593" y="485227"/>
             <a:ext cx="1473200" cy="635000"/>
           </a:xfrm>
           <a:prstGeom prst="rect">
@@ -3016,7 +3021,7 @@
         </p:nvSpPr>
         <p:spPr>
           <a:xfrm>
-            <a:off x="525081" y="3219231"/>
+            <a:off x="1883981" y="3246711"/>
             <a:ext cx="1473200" cy="635000"/>
           </a:xfrm>
           <a:prstGeom prst="rect">
@@ -3060,7 +3065,7 @@
         </p:nvSpPr>
         <p:spPr>
           <a:xfrm>
-            <a:off x="3784455" y="3219231"/>
+            <a:off x="3988787" y="3246711"/>
             <a:ext cx="1473200" cy="635000"/>
           </a:xfrm>
           <a:prstGeom prst="rect">
@@ -3089,8 +3094,12 @@
           <a:p>
             <a:pPr algn="ctr"/>
             <a:r>
-              <a:rPr lang="zh-CN" altLang="en-US" dirty="0" smtClean="0"/>
-              <a:t>生成流程</a:t>
+              <a:rPr lang="zh-CN" altLang="en-US" smtClean="0"/>
+              <a:t>生产</a:t>
+            </a:r>
+            <a:r>
+              <a:rPr lang="zh-CN" altLang="en-US" smtClean="0"/>
+              <a:t>流程</a:t>
             </a:r>
             <a:endParaRPr lang="en-US" dirty="0"/>
           </a:p>
@@ -3104,7 +3113,7 @@
         </p:nvSpPr>
         <p:spPr>
           <a:xfrm>
-            <a:off x="7043829" y="3219231"/>
+            <a:off x="6093593" y="3246711"/>
             <a:ext cx="1473200" cy="635000"/>
           </a:xfrm>
           <a:prstGeom prst="rect">
@@ -3148,7 +3157,7 @@
         </p:nvSpPr>
         <p:spPr>
           <a:xfrm>
-            <a:off x="10303203" y="3219231"/>
+            <a:off x="10303203" y="3246711"/>
             <a:ext cx="1473200" cy="635000"/>
           </a:xfrm>
           <a:prstGeom prst="rect">
@@ -3192,7 +3201,7 @@
         </p:nvSpPr>
         <p:spPr>
           <a:xfrm>
-            <a:off x="5418082" y="5628291"/>
+            <a:off x="6152275" y="5511581"/>
             <a:ext cx="1355835" cy="993227"/>
           </a:xfrm>
           <a:prstGeom prst="can">
@@ -3228,413 +3237,200 @@
           </a:p>
         </p:txBody>
       </p:sp>
-      <p:cxnSp>
-        <p:nvCxnSpPr>
-          <p:cNvPr id="19" name="Straight Arrow Connector 18"/>
-          <p:cNvCxnSpPr>
-            <a:stCxn id="4" idx="1"/>
-            <a:endCxn id="5" idx="0"/>
-          </p:cNvCxnSpPr>
+      <p:sp>
+        <p:nvSpPr>
+          <p:cNvPr id="21" name="Rectangle 20"/>
+          <p:cNvSpPr/>
           <p:nvPr/>
-        </p:nvCxnSpPr>
+        </p:nvSpPr>
         <p:spPr>
-          <a:xfrm flipH="1">
-            <a:off x="1261681" y="739227"/>
-            <a:ext cx="4097719" cy="2480004"/>
+          <a:xfrm>
+            <a:off x="8198399" y="3246711"/>
+            <a:ext cx="1473200" cy="635000"/>
           </a:xfrm>
-          <a:prstGeom prst="straightConnector1">
+          <a:prstGeom prst="rect">
             <a:avLst/>
           </a:prstGeom>
-          <a:ln>
-            <a:headEnd type="triangle"/>
-            <a:tailEnd type="triangle"/>
-          </a:ln>
         </p:spPr>
         <p:style>
-          <a:lnRef idx="1">
-            <a:schemeClr val="accent1"/>
+          <a:lnRef idx="2">
+            <a:schemeClr val="accent1">
+              <a:shade val="50000"/>
+            </a:schemeClr>
           </a:lnRef>
-          <a:fillRef idx="0">
+          <a:fillRef idx="1">
             <a:schemeClr val="accent1"/>
           </a:fillRef>
           <a:effectRef idx="0">
             <a:schemeClr val="accent1"/>
           </a:effectRef>
           <a:fontRef idx="minor">
-            <a:schemeClr val="tx1"/>
+            <a:schemeClr val="lt1"/>
           </a:fontRef>
         </p:style>
-      </p:cxnSp>
-      <p:cxnSp>
-        <p:nvCxnSpPr>
-          <p:cNvPr id="20" name="Straight Arrow Connector 19"/>
-          <p:cNvCxnSpPr>
-            <a:stCxn id="4" idx="2"/>
-            <a:endCxn id="6" idx="0"/>
-          </p:cNvCxnSpPr>
+        <p:txBody>
+          <a:bodyPr rtlCol="0" anchor="ctr"/>
+          <a:lstStyle/>
+          <a:p>
+            <a:pPr algn="ctr"/>
+            <a:r>
+              <a:rPr lang="zh-CN" altLang="en-US" dirty="0" smtClean="0"/>
+              <a:t>系统管理</a:t>
+            </a:r>
+            <a:endParaRPr lang="en-US" dirty="0"/>
+          </a:p>
+        </p:txBody>
+      </p:sp>
+      <p:sp>
+        <p:nvSpPr>
+          <p:cNvPr id="12" name="TextBox 11"/>
+          <p:cNvSpPr txBox="1"/>
           <p:nvPr/>
-        </p:nvCxnSpPr>
+        </p:nvSpPr>
         <p:spPr>
-          <a:xfrm flipH="1">
-            <a:off x="4521055" y="1056727"/>
-            <a:ext cx="1574945" cy="2162504"/>
+          <a:xfrm>
+            <a:off x="1464952" y="2046678"/>
+            <a:ext cx="10957035" cy="369332"/>
           </a:xfrm>
-          <a:prstGeom prst="straightConnector1">
+          <a:prstGeom prst="rect">
             <a:avLst/>
           </a:prstGeom>
-          <a:ln>
-            <a:headEnd type="triangle"/>
-            <a:tailEnd type="triangle"/>
-          </a:ln>
+          <a:noFill/>
         </p:spPr>
-        <p:style>
-          <a:lnRef idx="1">
-            <a:schemeClr val="accent1"/>
-          </a:lnRef>
-          <a:fillRef idx="0">
-            <a:schemeClr val="accent1"/>
-          </a:fillRef>
-          <a:effectRef idx="0">
-            <a:schemeClr val="accent1"/>
-          </a:effectRef>
-          <a:fontRef idx="minor">
-            <a:schemeClr val="tx1"/>
-          </a:fontRef>
-        </p:style>
-      </p:cxnSp>
-      <p:cxnSp>
-        <p:nvCxnSpPr>
-          <p:cNvPr id="22" name="Straight Arrow Connector 21"/>
-          <p:cNvCxnSpPr>
-            <a:stCxn id="4" idx="2"/>
-            <a:endCxn id="7" idx="0"/>
-          </p:cNvCxnSpPr>
+        <p:txBody>
+          <a:bodyPr wrap="square" rtlCol="0">
+            <a:spAutoFit/>
+          </a:bodyPr>
+          <a:lstStyle/>
+          <a:p>
+            <a:r>
+              <a:rPr lang="en-US" altLang="zh-CN" smtClean="0"/>
+              <a:t>-------------------------------------------------------------------------------------------------------------------------------------------------------</a:t>
+            </a:r>
+            <a:endParaRPr lang="en-US" dirty="0"/>
+          </a:p>
+        </p:txBody>
+      </p:sp>
+      <p:sp>
+        <p:nvSpPr>
+          <p:cNvPr id="13" name="TextBox 12"/>
+          <p:cNvSpPr txBox="1"/>
           <p:nvPr/>
-        </p:nvCxnSpPr>
+        </p:nvSpPr>
         <p:spPr>
           <a:xfrm>
-            <a:off x="6096000" y="1056727"/>
-            <a:ext cx="1684429" cy="2162504"/>
+            <a:off x="126124" y="1120227"/>
+            <a:ext cx="1338828" cy="369332"/>
           </a:xfrm>
-          <a:prstGeom prst="straightConnector1">
+          <a:prstGeom prst="rect">
             <a:avLst/>
           </a:prstGeom>
-          <a:ln>
-            <a:headEnd type="triangle"/>
-            <a:tailEnd type="triangle"/>
-          </a:ln>
+          <a:noFill/>
         </p:spPr>
-        <p:style>
-          <a:lnRef idx="1">
-            <a:schemeClr val="accent1"/>
-          </a:lnRef>
-          <a:fillRef idx="0">
-            <a:schemeClr val="accent1"/>
-          </a:fillRef>
-          <a:effectRef idx="0">
-            <a:schemeClr val="accent1"/>
-          </a:effectRef>
-          <a:fontRef idx="minor">
-            <a:schemeClr val="tx1"/>
-          </a:fontRef>
-        </p:style>
-      </p:cxnSp>
-      <p:cxnSp>
-        <p:nvCxnSpPr>
-          <p:cNvPr id="24" name="Straight Arrow Connector 23"/>
-          <p:cNvCxnSpPr>
-            <a:stCxn id="4" idx="3"/>
-            <a:endCxn id="8" idx="0"/>
-          </p:cNvCxnSpPr>
+        <p:txBody>
+          <a:bodyPr wrap="none" rtlCol="0">
+            <a:spAutoFit/>
+          </a:bodyPr>
+          <a:lstStyle/>
+          <a:p>
+            <a:r>
+              <a:rPr lang="zh-CN" altLang="en-US" dirty="0" smtClean="0"/>
+              <a:t>用户界面层</a:t>
+            </a:r>
+            <a:endParaRPr lang="en-US" dirty="0"/>
+          </a:p>
+        </p:txBody>
+      </p:sp>
+      <p:sp>
+        <p:nvSpPr>
+          <p:cNvPr id="29" name="TextBox 28"/>
+          <p:cNvSpPr txBox="1"/>
           <p:nvPr/>
-        </p:nvCxnSpPr>
+        </p:nvSpPr>
         <p:spPr>
           <a:xfrm>
-            <a:off x="6832600" y="739227"/>
-            <a:ext cx="4207203" cy="2480004"/>
+            <a:off x="1464952" y="4567683"/>
+            <a:ext cx="10957035" cy="369332"/>
           </a:xfrm>
-          <a:prstGeom prst="straightConnector1">
+          <a:prstGeom prst="rect">
             <a:avLst/>
           </a:prstGeom>
-          <a:ln>
-            <a:headEnd type="triangle"/>
-            <a:tailEnd type="triangle"/>
-          </a:ln>
+          <a:noFill/>
         </p:spPr>
-        <p:style>
-          <a:lnRef idx="1">
-            <a:schemeClr val="accent1"/>
-          </a:lnRef>
-          <a:fillRef idx="0">
-            <a:schemeClr val="accent1"/>
-          </a:fillRef>
-          <a:effectRef idx="0">
-            <a:schemeClr val="accent1"/>
-          </a:effectRef>
-          <a:fontRef idx="minor">
-            <a:schemeClr val="tx1"/>
-          </a:fontRef>
-        </p:style>
-      </p:cxnSp>
-      <p:cxnSp>
-        <p:nvCxnSpPr>
-          <p:cNvPr id="34" name="Straight Arrow Connector 33"/>
-          <p:cNvCxnSpPr>
-            <a:stCxn id="6" idx="1"/>
-            <a:endCxn id="5" idx="3"/>
-          </p:cNvCxnSpPr>
+        <p:txBody>
+          <a:bodyPr wrap="square" rtlCol="0">
+            <a:spAutoFit/>
+          </a:bodyPr>
+          <a:lstStyle/>
+          <a:p>
+            <a:r>
+              <a:rPr lang="en-US" altLang="zh-CN" smtClean="0"/>
+              <a:t>-------------------------------------------------------------------------------------------------------------------------------------------------------</a:t>
+            </a:r>
+            <a:endParaRPr lang="en-US" dirty="0"/>
+          </a:p>
+        </p:txBody>
+      </p:sp>
+      <p:sp>
+        <p:nvSpPr>
+          <p:cNvPr id="30" name="TextBox 29"/>
+          <p:cNvSpPr txBox="1"/>
           <p:nvPr/>
-        </p:nvCxnSpPr>
+        </p:nvSpPr>
         <p:spPr>
-          <a:xfrm flipH="1">
-            <a:off x="1998281" y="3536731"/>
-            <a:ext cx="1786174" cy="0"/>
+          <a:xfrm>
+            <a:off x="126124" y="5326915"/>
+            <a:ext cx="877163" cy="369332"/>
           </a:xfrm>
-          <a:prstGeom prst="straightConnector1">
+          <a:prstGeom prst="rect">
             <a:avLst/>
           </a:prstGeom>
-          <a:ln>
-            <a:headEnd type="triangle"/>
-            <a:tailEnd type="triangle"/>
-          </a:ln>
+          <a:noFill/>
         </p:spPr>
-        <p:style>
-          <a:lnRef idx="1">
-            <a:schemeClr val="accent1"/>
-          </a:lnRef>
-          <a:fillRef idx="0">
-            <a:schemeClr val="accent1"/>
-          </a:fillRef>
-          <a:effectRef idx="0">
-            <a:schemeClr val="accent1"/>
-          </a:effectRef>
-          <a:fontRef idx="minor">
-            <a:schemeClr val="tx1"/>
-          </a:fontRef>
-        </p:style>
-      </p:cxnSp>
-      <p:cxnSp>
-        <p:nvCxnSpPr>
-          <p:cNvPr id="37" name="Straight Arrow Connector 36"/>
-          <p:cNvCxnSpPr>
-            <a:stCxn id="7" idx="1"/>
-            <a:endCxn id="6" idx="3"/>
-          </p:cNvCxnSpPr>
+        <p:txBody>
+          <a:bodyPr wrap="none" rtlCol="0">
+            <a:spAutoFit/>
+          </a:bodyPr>
+          <a:lstStyle/>
+          <a:p>
+            <a:r>
+              <a:rPr lang="zh-CN" altLang="en-US" dirty="0" smtClean="0"/>
+              <a:t>数据层</a:t>
+            </a:r>
+            <a:endParaRPr lang="en-US" dirty="0"/>
+          </a:p>
+        </p:txBody>
+      </p:sp>
+      <p:sp>
+        <p:nvSpPr>
+          <p:cNvPr id="31" name="TextBox 30"/>
+          <p:cNvSpPr txBox="1"/>
           <p:nvPr/>
-        </p:nvCxnSpPr>
+        </p:nvSpPr>
         <p:spPr>
-          <a:xfrm flipH="1">
-            <a:off x="5257655" y="3536731"/>
-            <a:ext cx="1786174" cy="0"/>
+          <a:xfrm>
+            <a:off x="126124" y="3512379"/>
+            <a:ext cx="1338828" cy="369332"/>
           </a:xfrm>
-          <a:prstGeom prst="straightConnector1">
+          <a:prstGeom prst="rect">
             <a:avLst/>
           </a:prstGeom>
-          <a:ln>
-            <a:headEnd type="triangle"/>
-            <a:tailEnd type="triangle"/>
-          </a:ln>
+          <a:noFill/>
         </p:spPr>
-        <p:style>
-          <a:lnRef idx="1">
-            <a:schemeClr val="accent1"/>
-          </a:lnRef>
-          <a:fillRef idx="0">
-            <a:schemeClr val="accent1"/>
-          </a:fillRef>
-          <a:effectRef idx="0">
-            <a:schemeClr val="accent1"/>
-          </a:effectRef>
-          <a:fontRef idx="minor">
-            <a:schemeClr val="tx1"/>
-          </a:fontRef>
-        </p:style>
-      </p:cxnSp>
-      <p:cxnSp>
-        <p:nvCxnSpPr>
-          <p:cNvPr id="40" name="Straight Arrow Connector 39"/>
-          <p:cNvCxnSpPr>
-            <a:stCxn id="7" idx="3"/>
-            <a:endCxn id="8" idx="1"/>
-          </p:cNvCxnSpPr>
-          <p:nvPr/>
-        </p:nvCxnSpPr>
-        <p:spPr>
-          <a:xfrm>
-            <a:off x="8517029" y="3536731"/>
-            <a:ext cx="1786174" cy="0"/>
-          </a:xfrm>
-          <a:prstGeom prst="straightConnector1">
-            <a:avLst/>
-          </a:prstGeom>
-          <a:ln>
-            <a:headEnd type="triangle"/>
-            <a:tailEnd type="triangle"/>
-          </a:ln>
-        </p:spPr>
-        <p:style>
-          <a:lnRef idx="1">
-            <a:schemeClr val="accent1"/>
-          </a:lnRef>
-          <a:fillRef idx="0">
-            <a:schemeClr val="accent1"/>
-          </a:fillRef>
-          <a:effectRef idx="0">
-            <a:schemeClr val="accent1"/>
-          </a:effectRef>
-          <a:fontRef idx="minor">
-            <a:schemeClr val="tx1"/>
-          </a:fontRef>
-        </p:style>
-      </p:cxnSp>
-      <p:cxnSp>
-        <p:nvCxnSpPr>
-          <p:cNvPr id="44" name="Straight Arrow Connector 43"/>
-          <p:cNvCxnSpPr>
-            <a:stCxn id="10" idx="0"/>
-            <a:endCxn id="8" idx="2"/>
-          </p:cNvCxnSpPr>
-          <p:nvPr/>
-        </p:nvCxnSpPr>
-        <p:spPr>
-          <a:xfrm flipV="1">
-            <a:off x="6096000" y="3854231"/>
-            <a:ext cx="4943803" cy="2022367"/>
-          </a:xfrm>
-          <a:prstGeom prst="straightConnector1">
-            <a:avLst/>
-          </a:prstGeom>
-          <a:ln>
-            <a:headEnd type="triangle"/>
-            <a:tailEnd type="triangle"/>
-          </a:ln>
-        </p:spPr>
-        <p:style>
-          <a:lnRef idx="1">
-            <a:schemeClr val="accent1"/>
-          </a:lnRef>
-          <a:fillRef idx="0">
-            <a:schemeClr val="accent1"/>
-          </a:fillRef>
-          <a:effectRef idx="0">
-            <a:schemeClr val="accent1"/>
-          </a:effectRef>
-          <a:fontRef idx="minor">
-            <a:schemeClr val="tx1"/>
-          </a:fontRef>
-        </p:style>
-      </p:cxnSp>
-      <p:cxnSp>
-        <p:nvCxnSpPr>
-          <p:cNvPr id="47" name="Straight Arrow Connector 46"/>
-          <p:cNvCxnSpPr>
-            <a:stCxn id="10" idx="0"/>
-            <a:endCxn id="7" idx="2"/>
-          </p:cNvCxnSpPr>
-          <p:nvPr/>
-        </p:nvCxnSpPr>
-        <p:spPr>
-          <a:xfrm flipV="1">
-            <a:off x="6096000" y="3854231"/>
-            <a:ext cx="1684429" cy="2022367"/>
-          </a:xfrm>
-          <a:prstGeom prst="straightConnector1">
-            <a:avLst/>
-          </a:prstGeom>
-          <a:ln>
-            <a:headEnd type="triangle"/>
-            <a:tailEnd type="triangle"/>
-          </a:ln>
-        </p:spPr>
-        <p:style>
-          <a:lnRef idx="1">
-            <a:schemeClr val="accent1"/>
-          </a:lnRef>
-          <a:fillRef idx="0">
-            <a:schemeClr val="accent1"/>
-          </a:fillRef>
-          <a:effectRef idx="0">
-            <a:schemeClr val="accent1"/>
-          </a:effectRef>
-          <a:fontRef idx="minor">
-            <a:schemeClr val="tx1"/>
-          </a:fontRef>
-        </p:style>
-      </p:cxnSp>
-      <p:cxnSp>
-        <p:nvCxnSpPr>
-          <p:cNvPr id="50" name="Straight Arrow Connector 49"/>
-          <p:cNvCxnSpPr>
-            <a:stCxn id="10" idx="0"/>
-            <a:endCxn id="6" idx="2"/>
-          </p:cNvCxnSpPr>
-          <p:nvPr/>
-        </p:nvCxnSpPr>
-        <p:spPr>
-          <a:xfrm flipH="1" flipV="1">
-            <a:off x="4521055" y="3854231"/>
-            <a:ext cx="1574945" cy="2022367"/>
-          </a:xfrm>
-          <a:prstGeom prst="straightConnector1">
-            <a:avLst/>
-          </a:prstGeom>
-          <a:ln>
-            <a:headEnd type="triangle"/>
-            <a:tailEnd type="triangle"/>
-          </a:ln>
-        </p:spPr>
-        <p:style>
-          <a:lnRef idx="1">
-            <a:schemeClr val="accent1"/>
-          </a:lnRef>
-          <a:fillRef idx="0">
-            <a:schemeClr val="accent1"/>
-          </a:fillRef>
-          <a:effectRef idx="0">
-            <a:schemeClr val="accent1"/>
-          </a:effectRef>
-          <a:fontRef idx="minor">
-            <a:schemeClr val="tx1"/>
-          </a:fontRef>
-        </p:style>
-      </p:cxnSp>
-      <p:cxnSp>
-        <p:nvCxnSpPr>
-          <p:cNvPr id="53" name="Straight Arrow Connector 52"/>
-          <p:cNvCxnSpPr>
-            <a:stCxn id="10" idx="0"/>
-            <a:endCxn id="5" idx="2"/>
-          </p:cNvCxnSpPr>
-          <p:nvPr/>
-        </p:nvCxnSpPr>
-        <p:spPr>
-          <a:xfrm flipH="1" flipV="1">
-            <a:off x="1261681" y="3854231"/>
-            <a:ext cx="4834319" cy="2022367"/>
-          </a:xfrm>
-          <a:prstGeom prst="straightConnector1">
-            <a:avLst/>
-          </a:prstGeom>
-          <a:ln>
-            <a:headEnd type="triangle"/>
-            <a:tailEnd type="triangle"/>
-          </a:ln>
-        </p:spPr>
-        <p:style>
-          <a:lnRef idx="1">
-            <a:schemeClr val="accent1"/>
-          </a:lnRef>
-          <a:fillRef idx="0">
-            <a:schemeClr val="accent1"/>
-          </a:fillRef>
-          <a:effectRef idx="0">
-            <a:schemeClr val="accent1"/>
-          </a:effectRef>
-          <a:fontRef idx="minor">
-            <a:schemeClr val="tx1"/>
-          </a:fontRef>
-        </p:style>
-      </p:cxnSp>
+        <p:txBody>
+          <a:bodyPr wrap="none" rtlCol="0">
+            <a:spAutoFit/>
+          </a:bodyPr>
+          <a:lstStyle/>
+          <a:p>
+            <a:r>
+              <a:rPr lang="zh-CN" altLang="en-US" smtClean="0"/>
+              <a:t>后台逻辑层</a:t>
+            </a:r>
+            <a:endParaRPr lang="en-US" dirty="0"/>
+          </a:p>
+        </p:txBody>
+      </p:sp>
     </p:spTree>
     <p:extLst>
       <p:ext uri="{BB962C8B-B14F-4D97-AF65-F5344CB8AC3E}">

</xml_diff>